<commit_message>
summer school 2015 part 2
</commit_message>
<xml_diff>
--- a/2015/summer-school/2/index.pptx
+++ b/2015/summer-school/2/index.pptx
@@ -5,7 +5,7 @@
     <p:sldMasterId id="2147483660" r:id="rId5"/>
   </p:sldMasterIdLst>
   <p:notesMasterIdLst>
-    <p:notesMasterId r:id="rId19"/>
+    <p:notesMasterId r:id="rId21"/>
   </p:notesMasterIdLst>
   <p:sldIdLst>
     <p:sldId id="256" r:id="rId6"/>
@@ -13,14 +13,16 @@
     <p:sldId id="297" r:id="rId8"/>
     <p:sldId id="298" r:id="rId9"/>
     <p:sldId id="299" r:id="rId10"/>
-    <p:sldId id="300" r:id="rId11"/>
-    <p:sldId id="301" r:id="rId12"/>
-    <p:sldId id="302" r:id="rId13"/>
-    <p:sldId id="303" r:id="rId14"/>
-    <p:sldId id="304" r:id="rId15"/>
-    <p:sldId id="305" r:id="rId16"/>
-    <p:sldId id="306" r:id="rId17"/>
-    <p:sldId id="307" r:id="rId18"/>
+    <p:sldId id="308" r:id="rId11"/>
+    <p:sldId id="309" r:id="rId12"/>
+    <p:sldId id="300" r:id="rId13"/>
+    <p:sldId id="301" r:id="rId14"/>
+    <p:sldId id="302" r:id="rId15"/>
+    <p:sldId id="303" r:id="rId16"/>
+    <p:sldId id="304" r:id="rId17"/>
+    <p:sldId id="305" r:id="rId18"/>
+    <p:sldId id="306" r:id="rId19"/>
+    <p:sldId id="307" r:id="rId20"/>
   </p:sldIdLst>
   <p:sldSz cx="9144000" cy="6858000" type="screen4x3"/>
   <p:notesSz cx="6858000" cy="9144000"/>
@@ -121,7 +123,7 @@
   </p:defaultTextStyle>
   <p:extLst>
     <p:ext uri="{EFAFB233-063F-42B5-8137-9DF3F51BA10A}">
-      <p15:sldGuideLst xmlns:p15="http://schemas.microsoft.com/office/powerpoint/2012/main" xmlns="">
+      <p15:sldGuideLst xmlns:p15="http://schemas.microsoft.com/office/powerpoint/2012/main">
         <p15:guide id="1" orient="horz" pos="2160">
           <p15:clr>
             <a:srgbClr val="A4A3A4"/>
@@ -140,7 +142,7 @@
 
 <file path=ppt/commentAuthors.xml><?xml version="1.0" encoding="utf-8"?>
 <p:cmAuthorLst xmlns:a="http://schemas.openxmlformats.org/drawingml/2006/main" xmlns:r="http://schemas.openxmlformats.org/officeDocument/2006/relationships" xmlns:p="http://schemas.openxmlformats.org/presentationml/2006/main">
-  <p:cmAuthor id="2" name="Автор" initials="A" lastIdx="0" clrIdx="2"/>
+  <p:cmAuthor id="3" name="Author" initials="A" lastIdx="0" clrIdx="3"/>
 </p:cmAuthorLst>
 </file>
 
@@ -227,7 +229,7 @@
             <a:fld id="{FA6A2134-E741-4088-828E-62E3C110F254}" type="datetimeFigureOut">
               <a:rPr lang="ru-RU" smtClean="0"/>
               <a:pPr/>
-              <a:t>13.07.2015</a:t>
+              <a:t>14.07.2015</a:t>
             </a:fld>
             <a:endParaRPr lang="ru-RU"/>
           </a:p>
@@ -3178,12 +3180,23 @@
           <a:lstStyle/>
           <a:p>
             <a:r>
+              <a:rPr lang="en-US" sz="3200" dirty="0" smtClean="0"/>
+              <a:t>Polymer </a:t>
+            </a:r>
+            <a:r>
               <a:rPr lang="en-US" sz="3200" dirty="0"/>
-              <a:t>Polymer or </a:t>
+              <a:t>or </a:t>
             </a:r>
             <a:r>
               <a:rPr lang="en-US" sz="3200" dirty="0" smtClean="0"/>
-              <a:t>not</a:t>
+              <a:t>not Polymer</a:t>
+            </a:r>
+            <a:br>
+              <a:rPr lang="en-US" sz="3200" dirty="0" smtClean="0"/>
+            </a:br>
+            <a:r>
+              <a:rPr lang="en-US" sz="2400" dirty="0" smtClean="0"/>
+              <a:t>that is the question</a:t>
             </a:r>
             <a:endParaRPr lang="ru-RU" sz="2400" b="0" i="1" dirty="0"/>
           </a:p>
@@ -3238,7 +3251,7 @@
           <a:p>
             <a:r>
               <a:rPr lang="en-US" dirty="0" smtClean="0"/>
-              <a:t>Questions</a:t>
+              <a:t>Alternatives</a:t>
             </a:r>
             <a:endParaRPr lang="ru-RU" dirty="0"/>
           </a:p>
@@ -3266,7 +3279,7 @@
     </p:spTree>
     <p:extLst>
       <p:ext uri="{BB962C8B-B14F-4D97-AF65-F5344CB8AC3E}">
-        <p14:creationId xmlns:p14="http://schemas.microsoft.com/office/powerpoint/2010/main" val="3571992961"/>
+        <p14:creationId xmlns:p14="http://schemas.microsoft.com/office/powerpoint/2010/main" val="2420327454"/>
       </p:ext>
     </p:extLst>
   </p:cSld>
@@ -3310,7 +3323,7 @@
           <a:p>
             <a:r>
               <a:rPr lang="en-US" dirty="0" smtClean="0"/>
-              <a:t>Conclusion</a:t>
+              <a:t>Example</a:t>
             </a:r>
             <a:endParaRPr lang="ru-RU" dirty="0"/>
           </a:p>
@@ -3338,7 +3351,7 @@
     </p:spTree>
     <p:extLst>
       <p:ext uri="{BB962C8B-B14F-4D97-AF65-F5344CB8AC3E}">
-        <p14:creationId xmlns:p14="http://schemas.microsoft.com/office/powerpoint/2010/main" val="3333265290"/>
+        <p14:creationId xmlns:p14="http://schemas.microsoft.com/office/powerpoint/2010/main" val="3492314957"/>
       </p:ext>
     </p:extLst>
   </p:cSld>
@@ -3382,7 +3395,7 @@
           <a:p>
             <a:r>
               <a:rPr lang="en-US" dirty="0" smtClean="0"/>
-              <a:t>Contacts</a:t>
+              <a:t>Questions</a:t>
             </a:r>
             <a:endParaRPr lang="ru-RU" dirty="0"/>
           </a:p>
@@ -3410,6 +3423,150 @@
     </p:spTree>
     <p:extLst>
       <p:ext uri="{BB962C8B-B14F-4D97-AF65-F5344CB8AC3E}">
+        <p14:creationId xmlns:p14="http://schemas.microsoft.com/office/powerpoint/2010/main" val="3571992961"/>
+      </p:ext>
+    </p:extLst>
+  </p:cSld>
+  <p:clrMapOvr>
+    <a:masterClrMapping/>
+  </p:clrMapOvr>
+</p:sld>
+</file>
+
+<file path=ppt/slides/slide13.xml><?xml version="1.0" encoding="utf-8"?>
+<p:sld xmlns:a="http://schemas.openxmlformats.org/drawingml/2006/main" xmlns:r="http://schemas.openxmlformats.org/officeDocument/2006/relationships" xmlns:p="http://schemas.openxmlformats.org/presentationml/2006/main">
+  <p:cSld>
+    <p:spTree>
+      <p:nvGrpSpPr>
+        <p:cNvPr id="1" name=""/>
+        <p:cNvGrpSpPr/>
+        <p:nvPr/>
+      </p:nvGrpSpPr>
+      <p:grpSpPr>
+        <a:xfrm>
+          <a:off x="0" y="0"/>
+          <a:ext cx="0" cy="0"/>
+          <a:chOff x="0" y="0"/>
+          <a:chExt cx="0" cy="0"/>
+        </a:xfrm>
+      </p:grpSpPr>
+      <p:sp>
+        <p:nvSpPr>
+          <p:cNvPr id="2" name="Заголовок 1"/>
+          <p:cNvSpPr>
+            <a:spLocks noGrp="1"/>
+          </p:cNvSpPr>
+          <p:nvPr>
+            <p:ph type="title"/>
+          </p:nvPr>
+        </p:nvSpPr>
+        <p:spPr/>
+        <p:txBody>
+          <a:bodyPr/>
+          <a:lstStyle/>
+          <a:p>
+            <a:r>
+              <a:rPr lang="en-US" dirty="0" smtClean="0"/>
+              <a:t>Conclusion</a:t>
+            </a:r>
+            <a:endParaRPr lang="ru-RU" dirty="0"/>
+          </a:p>
+        </p:txBody>
+      </p:sp>
+      <p:sp>
+        <p:nvSpPr>
+          <p:cNvPr id="3" name="Текст 2"/>
+          <p:cNvSpPr>
+            <a:spLocks noGrp="1"/>
+          </p:cNvSpPr>
+          <p:nvPr>
+            <p:ph type="body" sz="quarter" idx="10"/>
+          </p:nvPr>
+        </p:nvSpPr>
+        <p:spPr/>
+        <p:txBody>
+          <a:bodyPr/>
+          <a:lstStyle/>
+          <a:p>
+            <a:endParaRPr lang="ru-RU"/>
+          </a:p>
+        </p:txBody>
+      </p:sp>
+    </p:spTree>
+    <p:extLst>
+      <p:ext uri="{BB962C8B-B14F-4D97-AF65-F5344CB8AC3E}">
+        <p14:creationId xmlns:p14="http://schemas.microsoft.com/office/powerpoint/2010/main" val="3333265290"/>
+      </p:ext>
+    </p:extLst>
+  </p:cSld>
+  <p:clrMapOvr>
+    <a:masterClrMapping/>
+  </p:clrMapOvr>
+</p:sld>
+</file>
+
+<file path=ppt/slides/slide14.xml><?xml version="1.0" encoding="utf-8"?>
+<p:sld xmlns:a="http://schemas.openxmlformats.org/drawingml/2006/main" xmlns:r="http://schemas.openxmlformats.org/officeDocument/2006/relationships" xmlns:p="http://schemas.openxmlformats.org/presentationml/2006/main">
+  <p:cSld>
+    <p:spTree>
+      <p:nvGrpSpPr>
+        <p:cNvPr id="1" name=""/>
+        <p:cNvGrpSpPr/>
+        <p:nvPr/>
+      </p:nvGrpSpPr>
+      <p:grpSpPr>
+        <a:xfrm>
+          <a:off x="0" y="0"/>
+          <a:ext cx="0" cy="0"/>
+          <a:chOff x="0" y="0"/>
+          <a:chExt cx="0" cy="0"/>
+        </a:xfrm>
+      </p:grpSpPr>
+      <p:sp>
+        <p:nvSpPr>
+          <p:cNvPr id="2" name="Заголовок 1"/>
+          <p:cNvSpPr>
+            <a:spLocks noGrp="1"/>
+          </p:cNvSpPr>
+          <p:nvPr>
+            <p:ph type="title"/>
+          </p:nvPr>
+        </p:nvSpPr>
+        <p:spPr/>
+        <p:txBody>
+          <a:bodyPr/>
+          <a:lstStyle/>
+          <a:p>
+            <a:r>
+              <a:rPr lang="en-US" dirty="0" smtClean="0"/>
+              <a:t>Contacts</a:t>
+            </a:r>
+            <a:endParaRPr lang="ru-RU" dirty="0"/>
+          </a:p>
+        </p:txBody>
+      </p:sp>
+      <p:sp>
+        <p:nvSpPr>
+          <p:cNvPr id="3" name="Текст 2"/>
+          <p:cNvSpPr>
+            <a:spLocks noGrp="1"/>
+          </p:cNvSpPr>
+          <p:nvPr>
+            <p:ph type="body" sz="quarter" idx="10"/>
+          </p:nvPr>
+        </p:nvSpPr>
+        <p:spPr/>
+        <p:txBody>
+          <a:bodyPr/>
+          <a:lstStyle/>
+          <a:p>
+            <a:endParaRPr lang="ru-RU"/>
+          </a:p>
+        </p:txBody>
+      </p:sp>
+    </p:spTree>
+    <p:extLst>
+      <p:ext uri="{BB962C8B-B14F-4D97-AF65-F5344CB8AC3E}">
         <p14:creationId xmlns:p14="http://schemas.microsoft.com/office/powerpoint/2010/main" val="2381330884"/>
       </p:ext>
     </p:extLst>
@@ -3420,7 +3577,7 @@
 </p:sld>
 </file>
 
-<file path=ppt/slides/slide13.xml><?xml version="1.0" encoding="utf-8"?>
+<file path=ppt/slides/slide15.xml><?xml version="1.0" encoding="utf-8"?>
 <p:sld xmlns:a="http://schemas.openxmlformats.org/drawingml/2006/main" xmlns:r="http://schemas.openxmlformats.org/officeDocument/2006/relationships" xmlns:p="http://schemas.openxmlformats.org/presentationml/2006/main">
   <p:cSld>
     <p:spTree>
@@ -3919,7 +4076,7 @@
       </p:sp>
       <p:sp>
         <p:nvSpPr>
-          <p:cNvPr id="3" name="Текст 2"/>
+          <p:cNvPr id="4" name="Text Placeholder 3"/>
           <p:cNvSpPr>
             <a:spLocks noGrp="1"/>
           </p:cNvSpPr>
@@ -3932,82 +4089,136 @@
           <a:bodyPr/>
           <a:lstStyle/>
           <a:p>
-            <a:pPr marL="342900" lvl="0" indent="-342900">
-              <a:buFont typeface="Arial" pitchFamily="34" charset="0"/>
-              <a:buChar char="•"/>
+            <a:pPr>
+              <a:buFontTx/>
+              <a:buChar char="-"/>
             </a:pPr>
             <a:r>
-              <a:rPr lang="ru-RU" sz="3200" dirty="0">
-                <a:solidFill>
-                  <a:prstClr val="black"/>
-                </a:solidFill>
-                <a:latin typeface="Calibri"/>
-                <a:ea typeface="+mn-ea"/>
-                <a:cs typeface="+mn-cs"/>
-              </a:rPr>
-              <a:t>Цель сайта – отобразить информацию, так сложилось, что через теги</a:t>
-            </a:r>
-          </a:p>
-          <a:p>
-            <a:pPr marL="342900" lvl="0" indent="-342900">
-              <a:buFont typeface="Arial" pitchFamily="34" charset="0"/>
-              <a:buChar char="•"/>
+              <a:rPr lang="en-US" dirty="0" smtClean="0"/>
+              <a:t>Multi-devices</a:t>
+            </a:r>
+          </a:p>
+          <a:p>
+            <a:pPr>
+              <a:buFontTx/>
+              <a:buChar char="-"/>
             </a:pPr>
             <a:r>
-              <a:rPr lang="ru-RU" sz="3200" dirty="0">
-                <a:solidFill>
-                  <a:prstClr val="black"/>
-                </a:solidFill>
-                <a:latin typeface="Calibri"/>
-                <a:ea typeface="+mn-ea"/>
-                <a:cs typeface="+mn-cs"/>
-              </a:rPr>
-              <a:t>Есть стандартные элементы (</a:t>
-            </a:r>
-            <a:r>
-              <a:rPr lang="en-US" sz="3200" dirty="0">
-                <a:solidFill>
-                  <a:prstClr val="black"/>
-                </a:solidFill>
-                <a:latin typeface="Calibri"/>
-                <a:ea typeface="+mn-ea"/>
-                <a:cs typeface="+mn-cs"/>
-              </a:rPr>
-              <a:t>input, button, …) </a:t>
-            </a:r>
-          </a:p>
-          <a:p>
-            <a:pPr marL="342900" lvl="0" indent="-342900">
-              <a:buFont typeface="Arial" pitchFamily="34" charset="0"/>
-              <a:buChar char="•"/>
+              <a:rPr lang="en-US" dirty="0" smtClean="0"/>
+              <a:t>Responsive, adaptive</a:t>
+            </a:r>
+          </a:p>
+          <a:p>
+            <a:pPr>
+              <a:buFontTx/>
+              <a:buChar char="-"/>
             </a:pPr>
             <a:r>
-              <a:rPr lang="ru-RU" sz="3200" dirty="0">
-                <a:solidFill>
-                  <a:prstClr val="black"/>
-                </a:solidFill>
-                <a:latin typeface="Calibri"/>
-                <a:ea typeface="+mn-ea"/>
-                <a:cs typeface="+mn-cs"/>
-              </a:rPr>
-              <a:t>Хочется красоты</a:t>
-            </a:r>
-          </a:p>
-          <a:p>
-            <a:pPr marL="342900" lvl="0" indent="-342900">
-              <a:buFont typeface="Arial" pitchFamily="34" charset="0"/>
-              <a:buChar char="•"/>
+              <a:rPr lang="en-US" dirty="0" smtClean="0"/>
+              <a:t>Plenty of </a:t>
+            </a:r>
+            <a:r>
+              <a:rPr lang="ru-RU" dirty="0" smtClean="0"/>
+              <a:t>реализаций одного и того же, сова в шоке, путаться в реализациях, запомниать</a:t>
+            </a:r>
+          </a:p>
+          <a:p>
+            <a:pPr>
+              <a:buFontTx/>
+              <a:buChar char="-"/>
             </a:pPr>
-            <a:endParaRPr lang="ru-RU" sz="3200" dirty="0">
-              <a:solidFill>
-                <a:prstClr val="black"/>
-              </a:solidFill>
-              <a:latin typeface="Calibri"/>
-              <a:ea typeface="+mn-ea"/>
-              <a:cs typeface="+mn-cs"/>
-            </a:endParaRPr>
-          </a:p>
-          <a:p>
+            <a:r>
+              <a:rPr lang="ru-RU" dirty="0" smtClean="0"/>
+              <a:t>Привыкаешь к фреймворку, к реализации и надо переучиваться</a:t>
+            </a:r>
+          </a:p>
+          <a:p>
+            <a:pPr>
+              <a:buFontTx/>
+              <a:buChar char="-"/>
+            </a:pPr>
+            <a:r>
+              <a:rPr lang="en-US" dirty="0" smtClean="0"/>
+              <a:t>Select </a:t>
+            </a:r>
+            <a:r>
+              <a:rPr lang="ru-RU" dirty="0" smtClean="0"/>
+              <a:t>тэг – простой пример вебкомпонента</a:t>
+            </a:r>
+          </a:p>
+          <a:p>
+            <a:pPr lvl="0"/>
+            <a:r>
+              <a:rPr lang="en-US" dirty="0"/>
+              <a:t>Google map or </a:t>
+            </a:r>
+            <a:r>
+              <a:rPr lang="en-US" dirty="0" err="1"/>
+              <a:t>yandex</a:t>
+            </a:r>
+            <a:r>
+              <a:rPr lang="en-US" dirty="0"/>
+              <a:t> map on the site -&gt; &lt;google-map&gt;&lt;/google-map&gt;</a:t>
+            </a:r>
+          </a:p>
+          <a:p>
+            <a:pPr lvl="0"/>
+            <a:r>
+              <a:rPr lang="en-US" dirty="0"/>
+              <a:t>X-</a:t>
+            </a:r>
+            <a:r>
+              <a:rPr lang="en-US" dirty="0" err="1"/>
+              <a:t>insta</a:t>
+            </a:r>
+            <a:r>
+              <a:rPr lang="en-US" dirty="0"/>
+              <a:t>-graph -&gt; </a:t>
+            </a:r>
+            <a:r>
+              <a:rPr lang="en-US" dirty="0" err="1"/>
+              <a:t>attr</a:t>
+            </a:r>
+            <a:r>
+              <a:rPr lang="en-US" dirty="0"/>
+              <a:t>=</a:t>
+            </a:r>
+            <a:r>
+              <a:rPr lang="en-US" dirty="0" err="1"/>
+              <a:t>dataart</a:t>
+            </a:r>
+            <a:r>
+              <a:rPr lang="en-US" dirty="0"/>
+              <a:t> -&gt; </a:t>
+            </a:r>
+            <a:endParaRPr lang="ru-RU" dirty="0"/>
+          </a:p>
+          <a:p>
+            <a:pPr>
+              <a:buFontTx/>
+              <a:buChar char="-"/>
+            </a:pPr>
+            <a:endParaRPr lang="ru-RU" dirty="0" smtClean="0"/>
+          </a:p>
+          <a:p>
+            <a:pPr>
+              <a:buFontTx/>
+              <a:buChar char="-"/>
+            </a:pPr>
+            <a:endParaRPr lang="ru-RU" dirty="0" smtClean="0"/>
+          </a:p>
+          <a:p>
+            <a:pPr>
+              <a:buFontTx/>
+              <a:buChar char="-"/>
+            </a:pPr>
+            <a:endParaRPr lang="ru-RU" dirty="0" smtClean="0"/>
+          </a:p>
+          <a:p>
+            <a:pPr>
+              <a:buFontTx/>
+              <a:buChar char="-"/>
+            </a:pPr>
             <a:endParaRPr lang="ru-RU" dirty="0"/>
           </a:p>
         </p:txBody>
@@ -4116,7 +4327,7 @@
       </p:grpSpPr>
       <p:sp>
         <p:nvSpPr>
-          <p:cNvPr id="2" name="Заголовок 1"/>
+          <p:cNvPr id="2" name="Title 1"/>
           <p:cNvSpPr>
             <a:spLocks noGrp="1"/>
           </p:cNvSpPr>
@@ -4131,7 +4342,7 @@
           <a:p>
             <a:r>
               <a:rPr lang="en-US" dirty="0" smtClean="0"/>
-              <a:t>Polymer</a:t>
+              <a:t>Web components</a:t>
             </a:r>
             <a:endParaRPr lang="ru-RU" dirty="0"/>
           </a:p>
@@ -4139,7 +4350,7 @@
       </p:sp>
       <p:sp>
         <p:nvSpPr>
-          <p:cNvPr id="3" name="Текст 2"/>
+          <p:cNvPr id="3" name="Text Placeholder 2"/>
           <p:cNvSpPr>
             <a:spLocks noGrp="1"/>
           </p:cNvSpPr>
@@ -4152,14 +4363,90 @@
           <a:bodyPr/>
           <a:lstStyle/>
           <a:p>
-            <a:endParaRPr lang="ru-RU"/>
+            <a:pPr>
+              <a:buFontTx/>
+              <a:buChar char="-"/>
+            </a:pPr>
+            <a:r>
+              <a:rPr lang="en-US" dirty="0" smtClean="0"/>
+              <a:t>Custom elements (ever-green, auto-update)</a:t>
+            </a:r>
+          </a:p>
+          <a:p>
+            <a:pPr>
+              <a:buFontTx/>
+              <a:buChar char="-"/>
+            </a:pPr>
+            <a:r>
+              <a:rPr lang="en-US" dirty="0" smtClean="0"/>
+              <a:t>Templates (native)</a:t>
+            </a:r>
+          </a:p>
+          <a:p>
+            <a:pPr>
+              <a:buFontTx/>
+              <a:buChar char="-"/>
+            </a:pPr>
+            <a:r>
+              <a:rPr lang="en-US" dirty="0" smtClean="0"/>
+              <a:t>Shadow DOM, </a:t>
+            </a:r>
+            <a:r>
+              <a:rPr lang="en-US" dirty="0" err="1" smtClean="0"/>
+              <a:t>dom</a:t>
+            </a:r>
+            <a:r>
+              <a:rPr lang="en-US" dirty="0" smtClean="0"/>
+              <a:t>/</a:t>
+            </a:r>
+            <a:r>
+              <a:rPr lang="en-US" dirty="0" err="1" smtClean="0"/>
+              <a:t>css</a:t>
+            </a:r>
+            <a:r>
+              <a:rPr lang="en-US" dirty="0" smtClean="0"/>
+              <a:t> scoping (like an iframe), example audio/video html5 tag</a:t>
+            </a:r>
+          </a:p>
+          <a:p>
+            <a:pPr>
+              <a:buFontTx/>
+              <a:buChar char="-"/>
+            </a:pPr>
+            <a:r>
+              <a:rPr lang="en-US" dirty="0" smtClean="0"/>
+              <a:t>Html imports &lt;link </a:t>
+            </a:r>
+            <a:r>
+              <a:rPr lang="en-US" dirty="0" err="1" smtClean="0"/>
+              <a:t>rel</a:t>
+            </a:r>
+            <a:r>
+              <a:rPr lang="en-US" dirty="0" smtClean="0"/>
+              <a:t>=“import” </a:t>
+            </a:r>
+            <a:r>
+              <a:rPr lang="en-US" dirty="0" err="1" smtClean="0"/>
+              <a:t>href</a:t>
+            </a:r>
+            <a:r>
+              <a:rPr lang="en-US" dirty="0" smtClean="0"/>
+              <a:t>=“”/&gt; (`vulcanize` to make less http requests)</a:t>
+            </a:r>
+          </a:p>
+          <a:p>
+            <a:pPr>
+              <a:buFontTx/>
+              <a:buChar char="-"/>
+            </a:pPr>
+            <a:endParaRPr lang="ru-RU" dirty="0"/>
           </a:p>
         </p:txBody>
       </p:sp>
     </p:spTree>
     <p:extLst>
       <p:ext uri="{BB962C8B-B14F-4D97-AF65-F5344CB8AC3E}">
-        <p14:creationId xmlns:p14="http://schemas.microsoft.com/office/powerpoint/2010/main" val="2061153534"/>
+        <p14:creationId xmlns:p14="http://schemas.microsoft.com/office/powerpoint/2010/main" val="3147787761"/>
       </p:ext>
     </p:extLst>
   </p:cSld>
@@ -4188,7 +4475,7 @@
       </p:grpSpPr>
       <p:sp>
         <p:nvSpPr>
-          <p:cNvPr id="2" name="Заголовок 1"/>
+          <p:cNvPr id="2" name="Title 1"/>
           <p:cNvSpPr>
             <a:spLocks noGrp="1"/>
           </p:cNvSpPr>
@@ -4203,7 +4490,7 @@
           <a:p>
             <a:r>
               <a:rPr lang="en-US" dirty="0" smtClean="0"/>
-              <a:t>Polymer Starter Kit</a:t>
+              <a:t>Web components support by browser</a:t>
             </a:r>
             <a:endParaRPr lang="ru-RU" dirty="0"/>
           </a:p>
@@ -4211,7 +4498,7 @@
       </p:sp>
       <p:sp>
         <p:nvSpPr>
-          <p:cNvPr id="3" name="Текст 2"/>
+          <p:cNvPr id="3" name="Text Placeholder 2"/>
           <p:cNvSpPr>
             <a:spLocks noGrp="1"/>
           </p:cNvSpPr>
@@ -4224,14 +4511,18 @@
           <a:bodyPr/>
           <a:lstStyle/>
           <a:p>
-            <a:endParaRPr lang="ru-RU"/>
+            <a:r>
+              <a:rPr lang="en-US" dirty="0" smtClean="0"/>
+              <a:t>POLYMER!!!</a:t>
+            </a:r>
+            <a:endParaRPr lang="ru-RU" dirty="0"/>
           </a:p>
         </p:txBody>
       </p:sp>
     </p:spTree>
     <p:extLst>
       <p:ext uri="{BB962C8B-B14F-4D97-AF65-F5344CB8AC3E}">
-        <p14:creationId xmlns:p14="http://schemas.microsoft.com/office/powerpoint/2010/main" val="3186861902"/>
+        <p14:creationId xmlns:p14="http://schemas.microsoft.com/office/powerpoint/2010/main" val="1555291403"/>
       </p:ext>
     </p:extLst>
   </p:cSld>
@@ -4275,7 +4566,7 @@
           <a:p>
             <a:r>
               <a:rPr lang="en-US" dirty="0" smtClean="0"/>
-              <a:t>Alternatives</a:t>
+              <a:t>Polymer</a:t>
             </a:r>
             <a:endParaRPr lang="ru-RU" dirty="0"/>
           </a:p>
@@ -4296,14 +4587,74 @@
           <a:bodyPr/>
           <a:lstStyle/>
           <a:p>
-            <a:endParaRPr lang="ru-RU"/>
+            <a:pPr>
+              <a:buFontTx/>
+              <a:buChar char="-"/>
+            </a:pPr>
+            <a:r>
+              <a:rPr lang="en-US" dirty="0" smtClean="0"/>
+              <a:t>Support old browsers</a:t>
+            </a:r>
+          </a:p>
+          <a:p>
+            <a:pPr>
+              <a:buFontTx/>
+              <a:buChar char="-"/>
+            </a:pPr>
+            <a:r>
+              <a:rPr lang="en-US" dirty="0" smtClean="0"/>
+              <a:t>Adds sugar</a:t>
+            </a:r>
+          </a:p>
+          <a:p>
+            <a:pPr>
+              <a:buFontTx/>
+              <a:buChar char="-"/>
+            </a:pPr>
+            <a:r>
+              <a:rPr lang="en-US" dirty="0" smtClean="0"/>
+              <a:t>`we have an element for that`</a:t>
+            </a:r>
+          </a:p>
+          <a:p>
+            <a:pPr>
+              <a:buFontTx/>
+              <a:buChar char="-"/>
+            </a:pPr>
+            <a:r>
+              <a:rPr lang="en-US" dirty="0" smtClean="0"/>
+              <a:t>A graph </a:t>
+            </a:r>
+          </a:p>
+          <a:p>
+            <a:pPr>
+              <a:buFontTx/>
+              <a:buChar char="-"/>
+            </a:pPr>
+            <a:endParaRPr lang="en-US" dirty="0" smtClean="0"/>
+          </a:p>
+          <a:p>
+            <a:endParaRPr lang="en-US" dirty="0"/>
+          </a:p>
+          <a:p>
+            <a:r>
+              <a:rPr lang="en-US" dirty="0" smtClean="0"/>
+              <a:t>Integration with angular/backbone and others</a:t>
+            </a:r>
+          </a:p>
+          <a:p>
+            <a:r>
+              <a:rPr lang="en-US" dirty="0" smtClean="0"/>
+              <a:t>Performance </a:t>
+            </a:r>
+            <a:endParaRPr lang="ru-RU" dirty="0"/>
           </a:p>
         </p:txBody>
       </p:sp>
     </p:spTree>
     <p:extLst>
       <p:ext uri="{BB962C8B-B14F-4D97-AF65-F5344CB8AC3E}">
-        <p14:creationId xmlns:p14="http://schemas.microsoft.com/office/powerpoint/2010/main" val="2420327454"/>
+        <p14:creationId xmlns:p14="http://schemas.microsoft.com/office/powerpoint/2010/main" val="2061153534"/>
       </p:ext>
     </p:extLst>
   </p:cSld>
@@ -4347,7 +4698,7 @@
           <a:p>
             <a:r>
               <a:rPr lang="en-US" dirty="0" smtClean="0"/>
-              <a:t>Example</a:t>
+              <a:t>Elements</a:t>
             </a:r>
             <a:endParaRPr lang="ru-RU" dirty="0"/>
           </a:p>
@@ -4368,14 +4719,53 @@
           <a:bodyPr/>
           <a:lstStyle/>
           <a:p>
-            <a:endParaRPr lang="ru-RU"/>
+            <a:pPr>
+              <a:buFontTx/>
+              <a:buChar char="-"/>
+            </a:pPr>
+            <a:r>
+              <a:rPr lang="en-US" dirty="0" smtClean="0"/>
+              <a:t>Core elements </a:t>
+            </a:r>
+          </a:p>
+          <a:p>
+            <a:pPr>
+              <a:buFontTx/>
+              <a:buChar char="-"/>
+            </a:pPr>
+            <a:r>
+              <a:rPr lang="en-US" dirty="0" smtClean="0"/>
+              <a:t>Paper elements</a:t>
+            </a:r>
+          </a:p>
+          <a:p>
+            <a:pPr>
+              <a:buFontTx/>
+              <a:buChar char="-"/>
+            </a:pPr>
+            <a:r>
+              <a:rPr lang="en-US" dirty="0" smtClean="0"/>
+              <a:t>All customizable</a:t>
+            </a:r>
+            <a:endParaRPr lang="en-US" dirty="0"/>
+          </a:p>
+          <a:p>
+            <a:pPr>
+              <a:buFontTx/>
+              <a:buChar char="-"/>
+            </a:pPr>
+            <a:r>
+              <a:rPr lang="ru-RU" dirty="0" smtClean="0"/>
+              <a:t>Архив элементов</a:t>
+            </a:r>
+            <a:endParaRPr lang="en-US" dirty="0" smtClean="0"/>
           </a:p>
         </p:txBody>
       </p:sp>
     </p:spTree>
     <p:extLst>
       <p:ext uri="{BB962C8B-B14F-4D97-AF65-F5344CB8AC3E}">
-        <p14:creationId xmlns:p14="http://schemas.microsoft.com/office/powerpoint/2010/main" val="3492314957"/>
+        <p14:creationId xmlns:p14="http://schemas.microsoft.com/office/powerpoint/2010/main" val="3186861902"/>
       </p:ext>
     </p:extLst>
   </p:cSld>
@@ -4903,6 +5293,108 @@
 </file>
 
 <file path=customXml/item2.xml><?xml version="1.0" encoding="utf-8"?>
+<?mso-contentType ?>
+<spe:Receivers xmlns:spe="http://schemas.microsoft.com/sharepoint/events">
+  <Receiver>
+    <Name>Document ID Generator</Name>
+    <Synchronization>Synchronous</Synchronization>
+    <Type>10001</Type>
+    <SequenceNumber>1000</SequenceNumber>
+    <Assembly>Microsoft.Office.DocumentManagement, Version=14.0.0.0, Culture=neutral, PublicKeyToken=71e9bce111e9429c</Assembly>
+    <Class>Microsoft.Office.DocumentManagement.Internal.DocIdHandler</Class>
+    <Data/>
+    <Filter/>
+  </Receiver>
+  <Receiver>
+    <Name>Document ID Generator</Name>
+    <Synchronization>Synchronous</Synchronization>
+    <Type>10002</Type>
+    <SequenceNumber>1001</SequenceNumber>
+    <Assembly>Microsoft.Office.DocumentManagement, Version=14.0.0.0, Culture=neutral, PublicKeyToken=71e9bce111e9429c</Assembly>
+    <Class>Microsoft.Office.DocumentManagement.Internal.DocIdHandler</Class>
+    <Data/>
+    <Filter/>
+  </Receiver>
+  <Receiver>
+    <Name>Document ID Generator</Name>
+    <Synchronization>Synchronous</Synchronization>
+    <Type>10004</Type>
+    <SequenceNumber>1002</SequenceNumber>
+    <Assembly>Microsoft.Office.DocumentManagement, Version=14.0.0.0, Culture=neutral, PublicKeyToken=71e9bce111e9429c</Assembly>
+    <Class>Microsoft.Office.DocumentManagement.Internal.DocIdHandler</Class>
+    <Data/>
+    <Filter/>
+  </Receiver>
+  <Receiver>
+    <Name>Document ID Generator</Name>
+    <Synchronization>Synchronous</Synchronization>
+    <Type>10006</Type>
+    <SequenceNumber>1003</SequenceNumber>
+    <Assembly>Microsoft.Office.DocumentManagement, Version=14.0.0.0, Culture=neutral, PublicKeyToken=71e9bce111e9429c</Assembly>
+    <Class>Microsoft.Office.DocumentManagement.Internal.DocIdHandler</Class>
+    <Data/>
+    <Filter/>
+  </Receiver>
+</spe:Receivers>
+</file>
+
+<file path=customXml/item3.xml><?xml version="1.0" encoding="utf-8"?>
+<p:properties xmlns:p="http://schemas.microsoft.com/office/2006/metadata/properties" xmlns:xsi="http://www.w3.org/2001/XMLSchema-instance" xmlns:pc="http://schemas.microsoft.com/office/infopath/2007/PartnerControls">
+  <documentManagement>
+    <DocumentType_x0020_KeywordsTaxHTField0 xmlns="8362049e-ea20-4f7b-ab37-9cd1897dc37d">
+      <Terms xmlns="http://schemas.microsoft.com/office/infopath/2007/PartnerControls">
+        <TermInfo xmlns="http://schemas.microsoft.com/office/infopath/2007/PartnerControls">
+          <TermName xmlns="http://schemas.microsoft.com/office/infopath/2007/PartnerControls">Presentation</TermName>
+          <TermId xmlns="http://schemas.microsoft.com/office/infopath/2007/PartnerControls">23dd44f6-29ee-4bb8-bde4-66b585eaec45</TermId>
+        </TermInfo>
+      </Terms>
+    </DocumentType_x0020_KeywordsTaxHTField0>
+    <b37ee5de16924ac7b0cb5e31911181fc xmlns="8362049e-ea20-4f7b-ab37-9cd1897dc37d">
+      <Terms xmlns="http://schemas.microsoft.com/office/infopath/2007/PartnerControls">
+        <TermInfo xmlns="http://schemas.microsoft.com/office/infopath/2007/PartnerControls">
+          <TermName xmlns="http://schemas.microsoft.com/office/infopath/2007/PartnerControls">Without NDA</TermName>
+          <TermId xmlns="http://schemas.microsoft.com/office/infopath/2007/PartnerControls">b89f01fe-bd20-4f35-b37a-5165c55fd4b8</TermId>
+        </TermInfo>
+      </Terms>
+    </b37ee5de16924ac7b0cb5e31911181fc>
+    <Technology_x0020_KeywordsTaxHTField0 xmlns="8362049e-ea20-4f7b-ab37-9cd1897dc37d">
+      <Terms xmlns="http://schemas.microsoft.com/office/infopath/2007/PartnerControls"/>
+    </Technology_x0020_KeywordsTaxHTField0>
+    <ActualityTaxHTField0 xmlns="8362049e-ea20-4f7b-ab37-9cd1897dc37d">
+      <Terms xmlns="http://schemas.microsoft.com/office/infopath/2007/PartnerControls">
+        <TermInfo xmlns="http://schemas.microsoft.com/office/infopath/2007/PartnerControls">
+          <TermName xmlns="http://schemas.microsoft.com/office/infopath/2007/PartnerControls">Actual</TermName>
+          <TermId xmlns="http://schemas.microsoft.com/office/infopath/2007/PartnerControls">5fb0f790-f2f4-4c62-91ec-6df0ce777128</TermId>
+        </TermInfo>
+      </Terms>
+    </ActualityTaxHTField0>
+    <TaxCatchAll xmlns="54429978-c88c-4a35-830f-7503bdbc69d2">
+      <Value>166</Value>
+      <Value>255</Value>
+      <Value>240</Value>
+      <Value>239</Value>
+    </TaxCatchAll>
+    <PublishingExpirationDate xmlns="http://schemas.microsoft.com/sharepoint/v3" xsi:nil="true"/>
+    <PublishingStartDate xmlns="http://schemas.microsoft.com/sharepoint/v3" xsi:nil="true"/>
+    <Client xmlns="8362049e-ea20-4f7b-ab37-9cd1897dc37d">DataArt</Client>
+    <Industry_x0020_KeywordsTaxHTField0 xmlns="8362049e-ea20-4f7b-ab37-9cd1897dc37d">
+      <Terms xmlns="http://schemas.microsoft.com/office/infopath/2007/PartnerControls">
+        <TermInfo xmlns="http://schemas.microsoft.com/office/infopath/2007/PartnerControls">
+          <TermName xmlns="http://schemas.microsoft.com/office/infopath/2007/PartnerControls">General</TermName>
+          <TermId xmlns="http://schemas.microsoft.com/office/infopath/2007/PartnerControls">a22d5110-bf26-48d4-b815-650dac917be4</TermId>
+        </TermInfo>
+      </Terms>
+    </Industry_x0020_KeywordsTaxHTField0>
+    <_dlc_DocId xmlns="54429978-c88c-4a35-830f-7503bdbc69d2">DATAART-5-8586</_dlc_DocId>
+    <_dlc_DocIdUrl xmlns="54429978-c88c-4a35-830f-7503bdbc69d2">
+      <Url>https://materials.dataart.com/_layouts/15/DocIdRedir.aspx?ID=DATAART-5-8586</Url>
+      <Description>DATAART-5-8586</Description>
+    </_dlc_DocIdUrl>
+  </documentManagement>
+</p:properties>
+</file>
+
+<file path=customXml/item4.xml><?xml version="1.0" encoding="utf-8"?>
 <ct:contentTypeSchema xmlns:ct="http://schemas.microsoft.com/office/2006/metadata/contentType" xmlns:ma="http://schemas.microsoft.com/office/2006/metadata/properties/metaAttributes" ct:_="" ma:_="" ma:contentTypeName="Document" ma:contentTypeID="0x01010036794A7B9AF780419FE08536B1AB702C" ma:contentTypeVersion="32" ma:contentTypeDescription="Create a new document." ma:contentTypeScope="" ma:versionID="f736756feb503f46d22cdf9b5b724e22">
   <xsd:schema xmlns:xsd="http://www.w3.org/2001/XMLSchema" xmlns:xs="http://www.w3.org/2001/XMLSchema" xmlns:p="http://schemas.microsoft.com/office/2006/metadata/properties" xmlns:ns1="http://schemas.microsoft.com/sharepoint/v3" xmlns:ns2="8362049e-ea20-4f7b-ab37-9cd1897dc37d" xmlns:ns3="54429978-c88c-4a35-830f-7503bdbc69d2" targetNamespace="http://schemas.microsoft.com/office/2006/metadata/properties" ma:root="true" ma:fieldsID="45f7dba6cc1e2b9c4ffab48959dccd88" ns1:_="" ns2:_="" ns3:_="">
     <xsd:import namespace="http://schemas.microsoft.com/sharepoint/v3"/>
@@ -5129,108 +5621,6 @@
 </ct:contentTypeSchema>
 </file>
 
-<file path=customXml/item3.xml><?xml version="1.0" encoding="utf-8"?>
-<p:properties xmlns:p="http://schemas.microsoft.com/office/2006/metadata/properties" xmlns:xsi="http://www.w3.org/2001/XMLSchema-instance" xmlns:pc="http://schemas.microsoft.com/office/infopath/2007/PartnerControls">
-  <documentManagement>
-    <DocumentType_x0020_KeywordsTaxHTField0 xmlns="8362049e-ea20-4f7b-ab37-9cd1897dc37d">
-      <Terms xmlns="http://schemas.microsoft.com/office/infopath/2007/PartnerControls">
-        <TermInfo xmlns="http://schemas.microsoft.com/office/infopath/2007/PartnerControls">
-          <TermName xmlns="http://schemas.microsoft.com/office/infopath/2007/PartnerControls">Presentation</TermName>
-          <TermId xmlns="http://schemas.microsoft.com/office/infopath/2007/PartnerControls">23dd44f6-29ee-4bb8-bde4-66b585eaec45</TermId>
-        </TermInfo>
-      </Terms>
-    </DocumentType_x0020_KeywordsTaxHTField0>
-    <b37ee5de16924ac7b0cb5e31911181fc xmlns="8362049e-ea20-4f7b-ab37-9cd1897dc37d">
-      <Terms xmlns="http://schemas.microsoft.com/office/infopath/2007/PartnerControls">
-        <TermInfo xmlns="http://schemas.microsoft.com/office/infopath/2007/PartnerControls">
-          <TermName xmlns="http://schemas.microsoft.com/office/infopath/2007/PartnerControls">Without NDA</TermName>
-          <TermId xmlns="http://schemas.microsoft.com/office/infopath/2007/PartnerControls">b89f01fe-bd20-4f35-b37a-5165c55fd4b8</TermId>
-        </TermInfo>
-      </Terms>
-    </b37ee5de16924ac7b0cb5e31911181fc>
-    <Technology_x0020_KeywordsTaxHTField0 xmlns="8362049e-ea20-4f7b-ab37-9cd1897dc37d">
-      <Terms xmlns="http://schemas.microsoft.com/office/infopath/2007/PartnerControls"/>
-    </Technology_x0020_KeywordsTaxHTField0>
-    <ActualityTaxHTField0 xmlns="8362049e-ea20-4f7b-ab37-9cd1897dc37d">
-      <Terms xmlns="http://schemas.microsoft.com/office/infopath/2007/PartnerControls">
-        <TermInfo xmlns="http://schemas.microsoft.com/office/infopath/2007/PartnerControls">
-          <TermName xmlns="http://schemas.microsoft.com/office/infopath/2007/PartnerControls">Actual</TermName>
-          <TermId xmlns="http://schemas.microsoft.com/office/infopath/2007/PartnerControls">5fb0f790-f2f4-4c62-91ec-6df0ce777128</TermId>
-        </TermInfo>
-      </Terms>
-    </ActualityTaxHTField0>
-    <TaxCatchAll xmlns="54429978-c88c-4a35-830f-7503bdbc69d2">
-      <Value>166</Value>
-      <Value>255</Value>
-      <Value>240</Value>
-      <Value>239</Value>
-    </TaxCatchAll>
-    <PublishingExpirationDate xmlns="http://schemas.microsoft.com/sharepoint/v3" xsi:nil="true"/>
-    <PublishingStartDate xmlns="http://schemas.microsoft.com/sharepoint/v3" xsi:nil="true"/>
-    <Client xmlns="8362049e-ea20-4f7b-ab37-9cd1897dc37d">DataArt</Client>
-    <Industry_x0020_KeywordsTaxHTField0 xmlns="8362049e-ea20-4f7b-ab37-9cd1897dc37d">
-      <Terms xmlns="http://schemas.microsoft.com/office/infopath/2007/PartnerControls">
-        <TermInfo xmlns="http://schemas.microsoft.com/office/infopath/2007/PartnerControls">
-          <TermName xmlns="http://schemas.microsoft.com/office/infopath/2007/PartnerControls">General</TermName>
-          <TermId xmlns="http://schemas.microsoft.com/office/infopath/2007/PartnerControls">a22d5110-bf26-48d4-b815-650dac917be4</TermId>
-        </TermInfo>
-      </Terms>
-    </Industry_x0020_KeywordsTaxHTField0>
-    <_dlc_DocId xmlns="54429978-c88c-4a35-830f-7503bdbc69d2">DATAART-5-8586</_dlc_DocId>
-    <_dlc_DocIdUrl xmlns="54429978-c88c-4a35-830f-7503bdbc69d2">
-      <Url>https://materials.dataart.com/_layouts/15/DocIdRedir.aspx?ID=DATAART-5-8586</Url>
-      <Description>DATAART-5-8586</Description>
-    </_dlc_DocIdUrl>
-  </documentManagement>
-</p:properties>
-</file>
-
-<file path=customXml/item4.xml><?xml version="1.0" encoding="utf-8"?>
-<?mso-contentType ?>
-<spe:Receivers xmlns:spe="http://schemas.microsoft.com/sharepoint/events">
-  <Receiver>
-    <Name>Document ID Generator</Name>
-    <Synchronization>Synchronous</Synchronization>
-    <Type>10001</Type>
-    <SequenceNumber>1000</SequenceNumber>
-    <Assembly>Microsoft.Office.DocumentManagement, Version=14.0.0.0, Culture=neutral, PublicKeyToken=71e9bce111e9429c</Assembly>
-    <Class>Microsoft.Office.DocumentManagement.Internal.DocIdHandler</Class>
-    <Data/>
-    <Filter/>
-  </Receiver>
-  <Receiver>
-    <Name>Document ID Generator</Name>
-    <Synchronization>Synchronous</Synchronization>
-    <Type>10002</Type>
-    <SequenceNumber>1001</SequenceNumber>
-    <Assembly>Microsoft.Office.DocumentManagement, Version=14.0.0.0, Culture=neutral, PublicKeyToken=71e9bce111e9429c</Assembly>
-    <Class>Microsoft.Office.DocumentManagement.Internal.DocIdHandler</Class>
-    <Data/>
-    <Filter/>
-  </Receiver>
-  <Receiver>
-    <Name>Document ID Generator</Name>
-    <Synchronization>Synchronous</Synchronization>
-    <Type>10004</Type>
-    <SequenceNumber>1002</SequenceNumber>
-    <Assembly>Microsoft.Office.DocumentManagement, Version=14.0.0.0, Culture=neutral, PublicKeyToken=71e9bce111e9429c</Assembly>
-    <Class>Microsoft.Office.DocumentManagement.Internal.DocIdHandler</Class>
-    <Data/>
-    <Filter/>
-  </Receiver>
-  <Receiver>
-    <Name>Document ID Generator</Name>
-    <Synchronization>Synchronous</Synchronization>
-    <Type>10006</Type>
-    <SequenceNumber>1003</SequenceNumber>
-    <Assembly>Microsoft.Office.DocumentManagement, Version=14.0.0.0, Culture=neutral, PublicKeyToken=71e9bce111e9429c</Assembly>
-    <Class>Microsoft.Office.DocumentManagement.Internal.DocIdHandler</Class>
-    <Data/>
-    <Filter/>
-  </Receiver>
-</spe:Receivers>
-</file>
-
 <file path=customXml/itemProps1.xml><?xml version="1.0" encoding="utf-8"?>
 <ds:datastoreItem xmlns:ds="http://schemas.openxmlformats.org/officeDocument/2006/customXml" ds:itemID="{E1746794-88BF-4464-B7E1-5DB94BDFB38F}">
   <ds:schemaRefs>
@@ -5240,21 +5630,9 @@
 </file>
 
 <file path=customXml/itemProps2.xml><?xml version="1.0" encoding="utf-8"?>
-<ds:datastoreItem xmlns:ds="http://schemas.openxmlformats.org/officeDocument/2006/customXml" ds:itemID="{27DC1969-330A-46A2-BE5F-8D1E0492BC76}">
+<ds:datastoreItem xmlns:ds="http://schemas.openxmlformats.org/officeDocument/2006/customXml" ds:itemID="{1B980003-51C1-4D8C-AEC4-0774F57E4C30}">
   <ds:schemaRefs>
-    <ds:schemaRef ds:uri="http://schemas.microsoft.com/office/2006/metadata/contentType"/>
-    <ds:schemaRef ds:uri="http://schemas.microsoft.com/office/2006/metadata/properties/metaAttributes"/>
-    <ds:schemaRef ds:uri="http://www.w3.org/2001/XMLSchema"/>
-    <ds:schemaRef ds:uri="http://schemas.microsoft.com/office/2006/metadata/properties"/>
-    <ds:schemaRef ds:uri="http://schemas.microsoft.com/sharepoint/v3"/>
-    <ds:schemaRef ds:uri="8362049e-ea20-4f7b-ab37-9cd1897dc37d"/>
-    <ds:schemaRef ds:uri="54429978-c88c-4a35-830f-7503bdbc69d2"/>
-    <ds:schemaRef ds:uri="http://schemas.microsoft.com/office/2006/documentManagement/types"/>
-    <ds:schemaRef ds:uri="http://schemas.microsoft.com/office/infopath/2007/PartnerControls"/>
-    <ds:schemaRef ds:uri="http://schemas.openxmlformats.org/package/2006/metadata/core-properties"/>
-    <ds:schemaRef ds:uri="http://purl.org/dc/elements/1.1/"/>
-    <ds:schemaRef ds:uri="http://purl.org/dc/terms/"/>
-    <ds:schemaRef ds:uri="http://schemas.microsoft.com/internal/obd"/>
+    <ds:schemaRef ds:uri="http://schemas.microsoft.com/sharepoint/events"/>
   </ds:schemaRefs>
 </ds:datastoreItem>
 </file>
@@ -5278,9 +5656,21 @@
 </file>
 
 <file path=customXml/itemProps4.xml><?xml version="1.0" encoding="utf-8"?>
-<ds:datastoreItem xmlns:ds="http://schemas.openxmlformats.org/officeDocument/2006/customXml" ds:itemID="{1B980003-51C1-4D8C-AEC4-0774F57E4C30}">
+<ds:datastoreItem xmlns:ds="http://schemas.openxmlformats.org/officeDocument/2006/customXml" ds:itemID="{27DC1969-330A-46A2-BE5F-8D1E0492BC76}">
   <ds:schemaRefs>
-    <ds:schemaRef ds:uri="http://schemas.microsoft.com/sharepoint/events"/>
+    <ds:schemaRef ds:uri="http://schemas.microsoft.com/office/2006/metadata/contentType"/>
+    <ds:schemaRef ds:uri="http://schemas.microsoft.com/office/2006/metadata/properties/metaAttributes"/>
+    <ds:schemaRef ds:uri="http://www.w3.org/2001/XMLSchema"/>
+    <ds:schemaRef ds:uri="http://schemas.microsoft.com/office/2006/metadata/properties"/>
+    <ds:schemaRef ds:uri="http://schemas.microsoft.com/sharepoint/v3"/>
+    <ds:schemaRef ds:uri="8362049e-ea20-4f7b-ab37-9cd1897dc37d"/>
+    <ds:schemaRef ds:uri="54429978-c88c-4a35-830f-7503bdbc69d2"/>
+    <ds:schemaRef ds:uri="http://schemas.microsoft.com/office/2006/documentManagement/types"/>
+    <ds:schemaRef ds:uri="http://schemas.microsoft.com/office/infopath/2007/PartnerControls"/>
+    <ds:schemaRef ds:uri="http://schemas.openxmlformats.org/package/2006/metadata/core-properties"/>
+    <ds:schemaRef ds:uri="http://purl.org/dc/elements/1.1/"/>
+    <ds:schemaRef ds:uri="http://purl.org/dc/terms/"/>
+    <ds:schemaRef ds:uri="http://schemas.microsoft.com/internal/obd"/>
   </ds:schemaRefs>
 </ds:datastoreItem>
 </file>
</xml_diff>